<commit_message>
added updated class diagramm
</commit_message>
<xml_diff>
--- a/doc/task09/Softwarearchitektur.pptx
+++ b/doc/task09/Softwarearchitektur.pptx
@@ -7,12 +7,12 @@
   <p:sldIdLst>
     <p:sldId id="256" r:id="rId2"/>
     <p:sldId id="257" r:id="rId3"/>
-    <p:sldId id="258" r:id="rId4"/>
-    <p:sldId id="262" r:id="rId5"/>
-    <p:sldId id="264" r:id="rId6"/>
-    <p:sldId id="259" r:id="rId7"/>
-    <p:sldId id="263" r:id="rId8"/>
-    <p:sldId id="260" r:id="rId9"/>
+    <p:sldId id="259" r:id="rId4"/>
+    <p:sldId id="263" r:id="rId5"/>
+    <p:sldId id="260" r:id="rId6"/>
+    <p:sldId id="258" r:id="rId7"/>
+    <p:sldId id="262" r:id="rId8"/>
+    <p:sldId id="264" r:id="rId9"/>
     <p:sldId id="261" r:id="rId10"/>
   </p:sldIdLst>
   <p:sldSz cx="12192000" cy="6858000"/>
@@ -246,7 +246,7 @@
           <a:p>
             <a:fld id="{50577D00-0568-4CC9-8CEB-845F93FB100F}" type="datetimeFigureOut">
               <a:rPr lang="de-CH" smtClean="0"/>
-              <a:t>02.05.2015</a:t>
+              <a:t>05.05.2015</a:t>
             </a:fld>
             <a:endParaRPr lang="de-CH"/>
           </a:p>
@@ -416,7 +416,7 @@
           <a:p>
             <a:fld id="{50577D00-0568-4CC9-8CEB-845F93FB100F}" type="datetimeFigureOut">
               <a:rPr lang="de-CH" smtClean="0"/>
-              <a:t>02.05.2015</a:t>
+              <a:t>05.05.2015</a:t>
             </a:fld>
             <a:endParaRPr lang="de-CH"/>
           </a:p>
@@ -596,7 +596,7 @@
           <a:p>
             <a:fld id="{50577D00-0568-4CC9-8CEB-845F93FB100F}" type="datetimeFigureOut">
               <a:rPr lang="de-CH" smtClean="0"/>
-              <a:t>02.05.2015</a:t>
+              <a:t>05.05.2015</a:t>
             </a:fld>
             <a:endParaRPr lang="de-CH"/>
           </a:p>
@@ -766,7 +766,7 @@
           <a:p>
             <a:fld id="{50577D00-0568-4CC9-8CEB-845F93FB100F}" type="datetimeFigureOut">
               <a:rPr lang="de-CH" smtClean="0"/>
-              <a:t>02.05.2015</a:t>
+              <a:t>05.05.2015</a:t>
             </a:fld>
             <a:endParaRPr lang="de-CH"/>
           </a:p>
@@ -1012,7 +1012,7 @@
           <a:p>
             <a:fld id="{50577D00-0568-4CC9-8CEB-845F93FB100F}" type="datetimeFigureOut">
               <a:rPr lang="de-CH" smtClean="0"/>
-              <a:t>02.05.2015</a:t>
+              <a:t>05.05.2015</a:t>
             </a:fld>
             <a:endParaRPr lang="de-CH"/>
           </a:p>
@@ -1244,7 +1244,7 @@
           <a:p>
             <a:fld id="{50577D00-0568-4CC9-8CEB-845F93FB100F}" type="datetimeFigureOut">
               <a:rPr lang="de-CH" smtClean="0"/>
-              <a:t>02.05.2015</a:t>
+              <a:t>05.05.2015</a:t>
             </a:fld>
             <a:endParaRPr lang="de-CH"/>
           </a:p>
@@ -1611,7 +1611,7 @@
           <a:p>
             <a:fld id="{50577D00-0568-4CC9-8CEB-845F93FB100F}" type="datetimeFigureOut">
               <a:rPr lang="de-CH" smtClean="0"/>
-              <a:t>02.05.2015</a:t>
+              <a:t>05.05.2015</a:t>
             </a:fld>
             <a:endParaRPr lang="de-CH"/>
           </a:p>
@@ -1729,7 +1729,7 @@
           <a:p>
             <a:fld id="{50577D00-0568-4CC9-8CEB-845F93FB100F}" type="datetimeFigureOut">
               <a:rPr lang="de-CH" smtClean="0"/>
-              <a:t>02.05.2015</a:t>
+              <a:t>05.05.2015</a:t>
             </a:fld>
             <a:endParaRPr lang="de-CH"/>
           </a:p>
@@ -1824,7 +1824,7 @@
           <a:p>
             <a:fld id="{50577D00-0568-4CC9-8CEB-845F93FB100F}" type="datetimeFigureOut">
               <a:rPr lang="de-CH" smtClean="0"/>
-              <a:t>02.05.2015</a:t>
+              <a:t>05.05.2015</a:t>
             </a:fld>
             <a:endParaRPr lang="de-CH"/>
           </a:p>
@@ -2101,7 +2101,7 @@
           <a:p>
             <a:fld id="{50577D00-0568-4CC9-8CEB-845F93FB100F}" type="datetimeFigureOut">
               <a:rPr lang="de-CH" smtClean="0"/>
-              <a:t>02.05.2015</a:t>
+              <a:t>05.05.2015</a:t>
             </a:fld>
             <a:endParaRPr lang="de-CH"/>
           </a:p>
@@ -2354,7 +2354,7 @@
           <a:p>
             <a:fld id="{50577D00-0568-4CC9-8CEB-845F93FB100F}" type="datetimeFigureOut">
               <a:rPr lang="de-CH" smtClean="0"/>
-              <a:t>02.05.2015</a:t>
+              <a:t>05.05.2015</a:t>
             </a:fld>
             <a:endParaRPr lang="de-CH"/>
           </a:p>
@@ -2567,7 +2567,7 @@
           <a:p>
             <a:fld id="{50577D00-0568-4CC9-8CEB-845F93FB100F}" type="datetimeFigureOut">
               <a:rPr lang="de-CH" smtClean="0"/>
-              <a:t>02.05.2015</a:t>
+              <a:t>05.05.2015</a:t>
             </a:fld>
             <a:endParaRPr lang="de-CH"/>
           </a:p>
@@ -3262,7 +3262,7 @@
             </a:pPr>
             <a:r>
               <a:rPr lang="de-CH" sz="3600" dirty="0" smtClean="0"/>
-              <a:t>Datenpersistenz</a:t>
+              <a:t>MVP</a:t>
             </a:r>
             <a:endParaRPr lang="de-CH" sz="3600" dirty="0"/>
           </a:p>
@@ -3276,9 +3276,8 @@
             </a:pPr>
             <a:r>
               <a:rPr lang="de-CH" sz="3600" dirty="0" smtClean="0"/>
-              <a:t>MVP</a:t>
-            </a:r>
-            <a:endParaRPr lang="de-CH" sz="3600" dirty="0"/>
+              <a:t>Architektur</a:t>
+            </a:r>
           </a:p>
           <a:p>
             <a:pPr marL="285750" indent="-285750">
@@ -3290,8 +3289,9 @@
             </a:pPr>
             <a:r>
               <a:rPr lang="de-CH" sz="3600" dirty="0" smtClean="0"/>
-              <a:t>Architektur</a:t>
-            </a:r>
+              <a:t>Datenpersistenz</a:t>
+            </a:r>
+            <a:endParaRPr lang="de-CH" sz="3600" dirty="0" smtClean="0"/>
           </a:p>
           <a:p>
             <a:pPr marL="285750" indent="-285750">
@@ -3421,7 +3421,7 @@
                   <a:schemeClr val="bg1"/>
                 </a:solidFill>
               </a:rPr>
-              <a:t>Datenpersistenz</a:t>
+              <a:t>MVP – Pattern </a:t>
             </a:r>
             <a:endParaRPr lang="de-CH" sz="7200" b="1" dirty="0">
               <a:solidFill>
@@ -3433,43 +3433,60 @@
       </p:sp>
       <p:pic>
         <p:nvPicPr>
-          <p:cNvPr id="3" name="Grafik 2"/>
+          <p:cNvPr id="5122" name="Picture 2" descr="http://upload.wikimedia.org/wikipedia/commons/thumb/7/76/Model_View_Presenter.png/300px-Model_View_Presenter.png"/>
           <p:cNvPicPr>
-            <a:picLocks noChangeAspect="1"/>
+            <a:picLocks noChangeAspect="1" noChangeArrowheads="1"/>
           </p:cNvPicPr>
           <p:nvPr/>
         </p:nvPicPr>
         <p:blipFill>
-          <a:blip r:embed="rId2"/>
+          <a:blip r:embed="rId2">
+            <a:extLst>
+              <a:ext uri="{28A0092B-C50C-407E-A947-70E740481C1C}">
+                <a14:useLocalDpi xmlns:a14="http://schemas.microsoft.com/office/drawing/2010/main" val="0"/>
+              </a:ext>
+            </a:extLst>
+          </a:blip>
+          <a:srcRect/>
           <a:stretch>
             <a:fillRect/>
           </a:stretch>
         </p:blipFill>
-        <p:spPr>
-          <a:xfrm>
-            <a:off x="1332835" y="2637555"/>
-            <a:ext cx="9526329" cy="2715004"/>
-          </a:xfrm>
-          <a:prstGeom prst="rect">
-            <a:avLst/>
-          </a:prstGeom>
-        </p:spPr>
-      </p:pic>
-      <p:sp>
-        <p:nvSpPr>
-          <p:cNvPr id="7" name="Textfeld 6"/>
-          <p:cNvSpPr txBox="1"/>
-          <p:nvPr/>
-        </p:nvSpPr>
-        <p:spPr>
-          <a:xfrm>
-            <a:off x="145142" y="6361117"/>
-            <a:ext cx="9124742" cy="369332"/>
+        <p:spPr bwMode="auto">
+          <a:xfrm>
+            <a:off x="3719739" y="2075530"/>
+            <a:ext cx="4752521" cy="3691126"/>
           </a:xfrm>
           <a:prstGeom prst="rect">
             <a:avLst/>
           </a:prstGeom>
           <a:noFill/>
+          <a:extLst>
+            <a:ext uri="{909E8E84-426E-40DD-AFC4-6F175D3DCCD1}">
+              <a14:hiddenFill xmlns:a14="http://schemas.microsoft.com/office/drawing/2010/main">
+                <a:solidFill>
+                  <a:srgbClr val="FFFFFF"/>
+                </a:solidFill>
+              </a14:hiddenFill>
+            </a:ext>
+          </a:extLst>
+        </p:spPr>
+      </p:pic>
+      <p:sp>
+        <p:nvSpPr>
+          <p:cNvPr id="5" name="Textfeld 4"/>
+          <p:cNvSpPr txBox="1"/>
+          <p:nvPr/>
+        </p:nvSpPr>
+        <p:spPr>
+          <a:xfrm>
+            <a:off x="145142" y="6361117"/>
+            <a:ext cx="9860584" cy="369332"/>
+          </a:xfrm>
+          <a:prstGeom prst="rect">
+            <a:avLst/>
+          </a:prstGeom>
+          <a:noFill/>
         </p:spPr>
         <p:txBody>
           <a:bodyPr wrap="none" rtlCol="0">
@@ -3479,7 +3496,7 @@
           <a:p>
             <a:r>
               <a:rPr lang="de-CH" i="1" dirty="0" smtClean="0"/>
-              <a:t>Bildquelle: http://www.mongodb.com/sites/mongodb.com/files/media/mongodb-logo-rgb.jpeg</a:t>
+              <a:t>Bildquelle: http://upload.wikimedia.org/wikipedia/commons/thumb/7/76/Model_View_Presenter.png</a:t>
             </a:r>
             <a:endParaRPr lang="de-CH" i="1" dirty="0"/>
           </a:p>
@@ -3488,7 +3505,7 @@
     </p:spTree>
     <p:extLst>
       <p:ext uri="{BB962C8B-B14F-4D97-AF65-F5344CB8AC3E}">
-        <p14:creationId xmlns:p14="http://schemas.microsoft.com/office/powerpoint/2010/main" val="2703701593"/>
+        <p14:creationId xmlns:p14="http://schemas.microsoft.com/office/powerpoint/2010/main" val="3735815208"/>
       </p:ext>
     </p:extLst>
   </p:cSld>
@@ -3537,7 +3554,7 @@
             <a:avLst/>
           </a:prstGeom>
           <a:solidFill>
-            <a:srgbClr val="D10505"/>
+            <a:srgbClr val="49C2F1"/>
           </a:solidFill>
           <a:ln>
             <a:noFill/>
@@ -3581,23 +3598,31 @@
         <p:spPr>
           <a:xfrm>
             <a:off x="145142" y="117668"/>
-            <a:ext cx="9144000" cy="1245734"/>
+            <a:ext cx="10522858" cy="1245734"/>
           </a:xfrm>
         </p:spPr>
         <p:txBody>
           <a:bodyPr>
-            <a:normAutofit/>
+            <a:noAutofit/>
           </a:bodyPr>
           <a:lstStyle/>
           <a:p>
             <a:pPr algn="l"/>
+            <a:r>
+              <a:rPr lang="de-CH" sz="7200" b="1" dirty="0" smtClean="0">
+                <a:solidFill>
+                  <a:schemeClr val="bg1"/>
+                </a:solidFill>
+              </a:rPr>
+              <a:t>MVP – Pattern mit </a:t>
+            </a:r>
             <a:r>
               <a:rPr lang="de-CH" sz="7200" b="1" dirty="0" err="1" smtClean="0">
                 <a:solidFill>
                   <a:schemeClr val="bg1"/>
                 </a:solidFill>
               </a:rPr>
-              <a:t>mongoDB</a:t>
+              <a:t>Vaadin</a:t>
             </a:r>
             <a:endParaRPr lang="de-CH" sz="7200" b="1" dirty="0">
               <a:solidFill>
@@ -3607,21 +3632,62 @@
           </a:p>
         </p:txBody>
       </p:sp>
-      <p:sp>
-        <p:nvSpPr>
-          <p:cNvPr id="5" name="Textfeld 4"/>
-          <p:cNvSpPr txBox="1"/>
+      <p:pic>
+        <p:nvPicPr>
+          <p:cNvPr id="2050" name="Picture 2" descr="https://vaadin.com/image/image_gallery?uuid=7f80fbd3-5ffe-402b-8663-1ae4953dc1c9&amp;groupId=15809&amp;t=1357818314255"/>
+          <p:cNvPicPr>
+            <a:picLocks noChangeAspect="1" noChangeArrowheads="1"/>
+          </p:cNvPicPr>
           <p:nvPr/>
-        </p:nvSpPr>
-        <p:spPr>
-          <a:xfrm>
-            <a:off x="551542" y="1932567"/>
-            <a:ext cx="3314049" cy="4247317"/>
+        </p:nvPicPr>
+        <p:blipFill>
+          <a:blip r:embed="rId2">
+            <a:extLst>
+              <a:ext uri="{28A0092B-C50C-407E-A947-70E740481C1C}">
+                <a14:useLocalDpi xmlns:a14="http://schemas.microsoft.com/office/drawing/2010/main" val="0"/>
+              </a:ext>
+            </a:extLst>
+          </a:blip>
+          <a:srcRect/>
+          <a:stretch>
+            <a:fillRect/>
+          </a:stretch>
+        </p:blipFill>
+        <p:spPr bwMode="auto">
+          <a:xfrm>
+            <a:off x="3068896" y="1944913"/>
+            <a:ext cx="5497708" cy="4137025"/>
           </a:xfrm>
           <a:prstGeom prst="rect">
             <a:avLst/>
           </a:prstGeom>
           <a:noFill/>
+          <a:extLst>
+            <a:ext uri="{909E8E84-426E-40DD-AFC4-6F175D3DCCD1}">
+              <a14:hiddenFill xmlns:a14="http://schemas.microsoft.com/office/drawing/2010/main">
+                <a:solidFill>
+                  <a:srgbClr val="FFFFFF"/>
+                </a:solidFill>
+              </a14:hiddenFill>
+            </a:ext>
+          </a:extLst>
+        </p:spPr>
+      </p:pic>
+      <p:sp>
+        <p:nvSpPr>
+          <p:cNvPr id="3" name="Textfeld 2"/>
+          <p:cNvSpPr txBox="1"/>
+          <p:nvPr/>
+        </p:nvSpPr>
+        <p:spPr>
+          <a:xfrm>
+            <a:off x="145142" y="6361117"/>
+            <a:ext cx="9565119" cy="369332"/>
+          </a:xfrm>
+          <a:prstGeom prst="rect">
+            <a:avLst/>
+          </a:prstGeom>
+          <a:noFill/>
         </p:spPr>
         <p:txBody>
           <a:bodyPr wrap="none" rtlCol="0">
@@ -3629,79 +3695,18 @@
           </a:bodyPr>
           <a:lstStyle/>
           <a:p>
-            <a:pPr marL="285750" indent="-285750">
-              <a:lnSpc>
-                <a:spcPct val="150000"/>
-              </a:lnSpc>
-              <a:buFont typeface="Arial" panose="020B0604020202020204" pitchFamily="34" charset="0"/>
-              <a:buChar char="•"/>
-            </a:pPr>
-            <a:r>
-              <a:rPr lang="de-CH" sz="3600" dirty="0" err="1" smtClean="0"/>
-              <a:t>OpenSource</a:t>
-            </a:r>
-            <a:endParaRPr lang="de-CH" sz="3600" dirty="0"/>
-          </a:p>
-          <a:p>
-            <a:pPr marL="285750" indent="-285750">
-              <a:lnSpc>
-                <a:spcPct val="150000"/>
-              </a:lnSpc>
-              <a:buFont typeface="Arial" panose="020B0604020202020204" pitchFamily="34" charset="0"/>
-              <a:buChar char="•"/>
-            </a:pPr>
-            <a:r>
-              <a:rPr lang="de-CH" sz="3600" dirty="0" err="1" smtClean="0"/>
-              <a:t>NoSQL</a:t>
-            </a:r>
-            <a:endParaRPr lang="de-CH" sz="3600" dirty="0"/>
-          </a:p>
-          <a:p>
-            <a:pPr marL="285750" indent="-285750">
-              <a:lnSpc>
-                <a:spcPct val="150000"/>
-              </a:lnSpc>
-              <a:buFont typeface="Arial" panose="020B0604020202020204" pitchFamily="34" charset="0"/>
-              <a:buChar char="•"/>
-            </a:pPr>
-            <a:r>
-              <a:rPr lang="de-CH" sz="3600" dirty="0" smtClean="0"/>
-              <a:t>Weit verbreitet</a:t>
-            </a:r>
-          </a:p>
-          <a:p>
-            <a:pPr marL="285750" indent="-285750">
-              <a:lnSpc>
-                <a:spcPct val="150000"/>
-              </a:lnSpc>
-              <a:buFont typeface="Arial" panose="020B0604020202020204" pitchFamily="34" charset="0"/>
-              <a:buChar char="•"/>
-            </a:pPr>
-            <a:r>
-              <a:rPr lang="de-CH" sz="3600" dirty="0" smtClean="0"/>
-              <a:t>Lokal</a:t>
-            </a:r>
-          </a:p>
-          <a:p>
-            <a:pPr marL="285750" indent="-285750">
-              <a:lnSpc>
-                <a:spcPct val="150000"/>
-              </a:lnSpc>
-              <a:buFont typeface="Arial" panose="020B0604020202020204" pitchFamily="34" charset="0"/>
-              <a:buChar char="•"/>
-            </a:pPr>
-            <a:r>
-              <a:rPr lang="de-CH" sz="3600" dirty="0" smtClean="0"/>
-              <a:t>JSON</a:t>
-            </a:r>
-            <a:endParaRPr lang="de-CH" sz="3600" dirty="0"/>
+            <a:r>
+              <a:rPr lang="de-CH" i="1" dirty="0" smtClean="0"/>
+              <a:t>Bildquelle: https://vaadin.com/web/magi/home/-/blogs/model-view-presenter-pattern-with-vaadin</a:t>
+            </a:r>
+            <a:endParaRPr lang="de-CH" i="1" dirty="0"/>
           </a:p>
         </p:txBody>
       </p:sp>
     </p:spTree>
     <p:extLst>
       <p:ext uri="{BB962C8B-B14F-4D97-AF65-F5344CB8AC3E}">
-        <p14:creationId xmlns:p14="http://schemas.microsoft.com/office/powerpoint/2010/main" val="982192119"/>
+        <p14:creationId xmlns:p14="http://schemas.microsoft.com/office/powerpoint/2010/main" val="1021523762"/>
       </p:ext>
     </p:extLst>
   </p:cSld>
@@ -3805,20 +3810,12 @@
           <a:p>
             <a:pPr algn="l"/>
             <a:r>
-              <a:rPr lang="de-CH" sz="7200" b="1" dirty="0" err="1" smtClean="0">
-                <a:solidFill>
-                  <a:schemeClr val="bg1"/>
-                </a:solidFill>
-              </a:rPr>
-              <a:t>mongoDB</a:t>
-            </a:r>
-            <a:r>
               <a:rPr lang="de-CH" sz="7200" b="1" dirty="0" smtClean="0">
                 <a:solidFill>
                   <a:schemeClr val="bg1"/>
                 </a:solidFill>
               </a:rPr>
-              <a:t> – ein Beispiel</a:t>
+              <a:t>Architekturdiagramm</a:t>
             </a:r>
             <a:endParaRPr lang="de-CH" sz="7200" b="1" dirty="0">
               <a:solidFill>
@@ -3828,40 +3825,10 @@
           </a:p>
         </p:txBody>
       </p:sp>
-      <p:sp>
-        <p:nvSpPr>
-          <p:cNvPr id="7" name="Textfeld 6"/>
-          <p:cNvSpPr txBox="1"/>
-          <p:nvPr/>
-        </p:nvSpPr>
-        <p:spPr>
-          <a:xfrm>
-            <a:off x="471621" y="2032001"/>
-            <a:ext cx="237566" cy="369332"/>
-          </a:xfrm>
-          <a:prstGeom prst="rect">
-            <a:avLst/>
-          </a:prstGeom>
-          <a:noFill/>
-        </p:spPr>
-        <p:txBody>
-          <a:bodyPr wrap="none" rtlCol="0">
-            <a:spAutoFit/>
-          </a:bodyPr>
-          <a:lstStyle/>
-          <a:p>
-            <a:r>
-              <a:rPr lang="de-CH" dirty="0" smtClean="0"/>
-              <a:t> </a:t>
-            </a:r>
-            <a:endParaRPr lang="de-CH" dirty="0"/>
-          </a:p>
-        </p:txBody>
-      </p:sp>
     </p:spTree>
     <p:extLst>
       <p:ext uri="{BB962C8B-B14F-4D97-AF65-F5344CB8AC3E}">
-        <p14:creationId xmlns:p14="http://schemas.microsoft.com/office/powerpoint/2010/main" val="3738221479"/>
+        <p14:creationId xmlns:p14="http://schemas.microsoft.com/office/powerpoint/2010/main" val="2092509293"/>
       </p:ext>
     </p:extLst>
   </p:cSld>
@@ -3970,7 +3937,7 @@
                   <a:schemeClr val="bg1"/>
                 </a:solidFill>
               </a:rPr>
-              <a:t>MVP – Pattern </a:t>
+              <a:t>Datenpersistenz</a:t>
             </a:r>
             <a:endParaRPr lang="de-CH" sz="7200" b="1" dirty="0">
               <a:solidFill>
@@ -3982,60 +3949,43 @@
       </p:sp>
       <p:pic>
         <p:nvPicPr>
-          <p:cNvPr id="5122" name="Picture 2" descr="http://upload.wikimedia.org/wikipedia/commons/thumb/7/76/Model_View_Presenter.png/300px-Model_View_Presenter.png"/>
+          <p:cNvPr id="3" name="Grafik 2"/>
           <p:cNvPicPr>
-            <a:picLocks noChangeAspect="1" noChangeArrowheads="1"/>
+            <a:picLocks noChangeAspect="1"/>
           </p:cNvPicPr>
           <p:nvPr/>
         </p:nvPicPr>
         <p:blipFill>
-          <a:blip r:embed="rId2">
-            <a:extLst>
-              <a:ext uri="{28A0092B-C50C-407E-A947-70E740481C1C}">
-                <a14:useLocalDpi xmlns:a14="http://schemas.microsoft.com/office/drawing/2010/main" val="0"/>
-              </a:ext>
-            </a:extLst>
-          </a:blip>
-          <a:srcRect/>
+          <a:blip r:embed="rId2"/>
           <a:stretch>
             <a:fillRect/>
           </a:stretch>
         </p:blipFill>
-        <p:spPr bwMode="auto">
-          <a:xfrm>
-            <a:off x="3719739" y="2075530"/>
-            <a:ext cx="4752521" cy="3691126"/>
+        <p:spPr>
+          <a:xfrm>
+            <a:off x="1332835" y="2637555"/>
+            <a:ext cx="9526329" cy="2715004"/>
+          </a:xfrm>
+          <a:prstGeom prst="rect">
+            <a:avLst/>
+          </a:prstGeom>
+        </p:spPr>
+      </p:pic>
+      <p:sp>
+        <p:nvSpPr>
+          <p:cNvPr id="7" name="Textfeld 6"/>
+          <p:cNvSpPr txBox="1"/>
+          <p:nvPr/>
+        </p:nvSpPr>
+        <p:spPr>
+          <a:xfrm>
+            <a:off x="145142" y="6361117"/>
+            <a:ext cx="9124742" cy="369332"/>
           </a:xfrm>
           <a:prstGeom prst="rect">
             <a:avLst/>
           </a:prstGeom>
           <a:noFill/>
-          <a:extLst>
-            <a:ext uri="{909E8E84-426E-40DD-AFC4-6F175D3DCCD1}">
-              <a14:hiddenFill xmlns:a14="http://schemas.microsoft.com/office/drawing/2010/main">
-                <a:solidFill>
-                  <a:srgbClr val="FFFFFF"/>
-                </a:solidFill>
-              </a14:hiddenFill>
-            </a:ext>
-          </a:extLst>
-        </p:spPr>
-      </p:pic>
-      <p:sp>
-        <p:nvSpPr>
-          <p:cNvPr id="5" name="Textfeld 4"/>
-          <p:cNvSpPr txBox="1"/>
-          <p:nvPr/>
-        </p:nvSpPr>
-        <p:spPr>
-          <a:xfrm>
-            <a:off x="145142" y="6361117"/>
-            <a:ext cx="9860584" cy="369332"/>
-          </a:xfrm>
-          <a:prstGeom prst="rect">
-            <a:avLst/>
-          </a:prstGeom>
-          <a:noFill/>
         </p:spPr>
         <p:txBody>
           <a:bodyPr wrap="none" rtlCol="0">
@@ -4045,7 +3995,7 @@
           <a:p>
             <a:r>
               <a:rPr lang="de-CH" i="1" dirty="0" smtClean="0"/>
-              <a:t>Bildquelle: http://upload.wikimedia.org/wikipedia/commons/thumb/7/76/Model_View_Presenter.png</a:t>
+              <a:t>Bildquelle: http://www.mongodb.com/sites/mongodb.com/files/media/mongodb-logo-rgb.jpeg</a:t>
             </a:r>
             <a:endParaRPr lang="de-CH" i="1" dirty="0"/>
           </a:p>
@@ -4054,7 +4004,7 @@
     </p:spTree>
     <p:extLst>
       <p:ext uri="{BB962C8B-B14F-4D97-AF65-F5344CB8AC3E}">
-        <p14:creationId xmlns:p14="http://schemas.microsoft.com/office/powerpoint/2010/main" val="3735815208"/>
+        <p14:creationId xmlns:p14="http://schemas.microsoft.com/office/powerpoint/2010/main" val="2703701593"/>
       </p:ext>
     </p:extLst>
   </p:cSld>
@@ -4103,7 +4053,7 @@
             <a:avLst/>
           </a:prstGeom>
           <a:solidFill>
-            <a:srgbClr val="49C2F1"/>
+            <a:srgbClr val="D10505"/>
           </a:solidFill>
           <a:ln>
             <a:noFill/>
@@ -4147,31 +4097,23 @@
         <p:spPr>
           <a:xfrm>
             <a:off x="145142" y="117668"/>
-            <a:ext cx="10522858" cy="1245734"/>
+            <a:ext cx="9144000" cy="1245734"/>
           </a:xfrm>
         </p:spPr>
         <p:txBody>
           <a:bodyPr>
-            <a:noAutofit/>
+            <a:normAutofit/>
           </a:bodyPr>
           <a:lstStyle/>
           <a:p>
             <a:pPr algn="l"/>
-            <a:r>
-              <a:rPr lang="de-CH" sz="7200" b="1" dirty="0" smtClean="0">
-                <a:solidFill>
-                  <a:schemeClr val="bg1"/>
-                </a:solidFill>
-              </a:rPr>
-              <a:t>MVP – Pattern mit </a:t>
-            </a:r>
             <a:r>
               <a:rPr lang="de-CH" sz="7200" b="1" dirty="0" err="1" smtClean="0">
                 <a:solidFill>
                   <a:schemeClr val="bg1"/>
                 </a:solidFill>
               </a:rPr>
-              <a:t>Vaadin</a:t>
+              <a:t>mongoDB</a:t>
             </a:r>
             <a:endParaRPr lang="de-CH" sz="7200" b="1" dirty="0">
               <a:solidFill>
@@ -4181,62 +4123,21 @@
           </a:p>
         </p:txBody>
       </p:sp>
-      <p:pic>
-        <p:nvPicPr>
-          <p:cNvPr id="2050" name="Picture 2" descr="https://vaadin.com/image/image_gallery?uuid=7f80fbd3-5ffe-402b-8663-1ae4953dc1c9&amp;groupId=15809&amp;t=1357818314255"/>
-          <p:cNvPicPr>
-            <a:picLocks noChangeAspect="1" noChangeArrowheads="1"/>
-          </p:cNvPicPr>
+      <p:sp>
+        <p:nvSpPr>
+          <p:cNvPr id="5" name="Textfeld 4"/>
+          <p:cNvSpPr txBox="1"/>
           <p:nvPr/>
-        </p:nvPicPr>
-        <p:blipFill>
-          <a:blip r:embed="rId2">
-            <a:extLst>
-              <a:ext uri="{28A0092B-C50C-407E-A947-70E740481C1C}">
-                <a14:useLocalDpi xmlns:a14="http://schemas.microsoft.com/office/drawing/2010/main" val="0"/>
-              </a:ext>
-            </a:extLst>
-          </a:blip>
-          <a:srcRect/>
-          <a:stretch>
-            <a:fillRect/>
-          </a:stretch>
-        </p:blipFill>
-        <p:spPr bwMode="auto">
-          <a:xfrm>
-            <a:off x="3068896" y="1944914"/>
-            <a:ext cx="5497708" cy="4137025"/>
+        </p:nvSpPr>
+        <p:spPr>
+          <a:xfrm>
+            <a:off x="551542" y="1932567"/>
+            <a:ext cx="3314049" cy="4247317"/>
           </a:xfrm>
           <a:prstGeom prst="rect">
             <a:avLst/>
           </a:prstGeom>
           <a:noFill/>
-          <a:extLst>
-            <a:ext uri="{909E8E84-426E-40DD-AFC4-6F175D3DCCD1}">
-              <a14:hiddenFill xmlns:a14="http://schemas.microsoft.com/office/drawing/2010/main">
-                <a:solidFill>
-                  <a:srgbClr val="FFFFFF"/>
-                </a:solidFill>
-              </a14:hiddenFill>
-            </a:ext>
-          </a:extLst>
-        </p:spPr>
-      </p:pic>
-      <p:sp>
-        <p:nvSpPr>
-          <p:cNvPr id="3" name="Textfeld 2"/>
-          <p:cNvSpPr txBox="1"/>
-          <p:nvPr/>
-        </p:nvSpPr>
-        <p:spPr>
-          <a:xfrm>
-            <a:off x="145142" y="6361117"/>
-            <a:ext cx="9565119" cy="369332"/>
-          </a:xfrm>
-          <a:prstGeom prst="rect">
-            <a:avLst/>
-          </a:prstGeom>
-          <a:noFill/>
         </p:spPr>
         <p:txBody>
           <a:bodyPr wrap="none" rtlCol="0">
@@ -4244,18 +4145,79 @@
           </a:bodyPr>
           <a:lstStyle/>
           <a:p>
-            <a:r>
-              <a:rPr lang="de-CH" i="1" dirty="0" smtClean="0"/>
-              <a:t>Bildquelle: https://vaadin.com/web/magi/home/-/blogs/model-view-presenter-pattern-with-vaadin</a:t>
-            </a:r>
-            <a:endParaRPr lang="de-CH" i="1" dirty="0"/>
+            <a:pPr marL="285750" indent="-285750">
+              <a:lnSpc>
+                <a:spcPct val="150000"/>
+              </a:lnSpc>
+              <a:buFont typeface="Arial" panose="020B0604020202020204" pitchFamily="34" charset="0"/>
+              <a:buChar char="•"/>
+            </a:pPr>
+            <a:r>
+              <a:rPr lang="de-CH" sz="3600" dirty="0" err="1" smtClean="0"/>
+              <a:t>OpenSource</a:t>
+            </a:r>
+            <a:endParaRPr lang="de-CH" sz="3600" dirty="0"/>
+          </a:p>
+          <a:p>
+            <a:pPr marL="285750" indent="-285750">
+              <a:lnSpc>
+                <a:spcPct val="150000"/>
+              </a:lnSpc>
+              <a:buFont typeface="Arial" panose="020B0604020202020204" pitchFamily="34" charset="0"/>
+              <a:buChar char="•"/>
+            </a:pPr>
+            <a:r>
+              <a:rPr lang="de-CH" sz="3600" dirty="0" err="1" smtClean="0"/>
+              <a:t>NoSQL</a:t>
+            </a:r>
+            <a:endParaRPr lang="de-CH" sz="3600" dirty="0"/>
+          </a:p>
+          <a:p>
+            <a:pPr marL="285750" indent="-285750">
+              <a:lnSpc>
+                <a:spcPct val="150000"/>
+              </a:lnSpc>
+              <a:buFont typeface="Arial" panose="020B0604020202020204" pitchFamily="34" charset="0"/>
+              <a:buChar char="•"/>
+            </a:pPr>
+            <a:r>
+              <a:rPr lang="de-CH" sz="3600" dirty="0" smtClean="0"/>
+              <a:t>Weit verbreitet</a:t>
+            </a:r>
+          </a:p>
+          <a:p>
+            <a:pPr marL="285750" indent="-285750">
+              <a:lnSpc>
+                <a:spcPct val="150000"/>
+              </a:lnSpc>
+              <a:buFont typeface="Arial" panose="020B0604020202020204" pitchFamily="34" charset="0"/>
+              <a:buChar char="•"/>
+            </a:pPr>
+            <a:r>
+              <a:rPr lang="de-CH" sz="3600" dirty="0" smtClean="0"/>
+              <a:t>Lokal</a:t>
+            </a:r>
+          </a:p>
+          <a:p>
+            <a:pPr marL="285750" indent="-285750">
+              <a:lnSpc>
+                <a:spcPct val="150000"/>
+              </a:lnSpc>
+              <a:buFont typeface="Arial" panose="020B0604020202020204" pitchFamily="34" charset="0"/>
+              <a:buChar char="•"/>
+            </a:pPr>
+            <a:r>
+              <a:rPr lang="de-CH" sz="3600" dirty="0" smtClean="0"/>
+              <a:t>JSON</a:t>
+            </a:r>
+            <a:endParaRPr lang="de-CH" sz="3600" dirty="0"/>
           </a:p>
         </p:txBody>
       </p:sp>
     </p:spTree>
     <p:extLst>
       <p:ext uri="{BB962C8B-B14F-4D97-AF65-F5344CB8AC3E}">
-        <p14:creationId xmlns:p14="http://schemas.microsoft.com/office/powerpoint/2010/main" val="1021523762"/>
+        <p14:creationId xmlns:p14="http://schemas.microsoft.com/office/powerpoint/2010/main" val="982192119"/>
       </p:ext>
     </p:extLst>
   </p:cSld>
@@ -4358,14 +4320,6 @@
           <a:lstStyle/>
           <a:p>
             <a:pPr algn="l"/>
-            <a:r>
-              <a:rPr lang="de-CH" sz="7200" b="1" dirty="0" smtClean="0">
-                <a:solidFill>
-                  <a:schemeClr val="bg1"/>
-                </a:solidFill>
-              </a:rPr>
-              <a:t>Architekturdiagramm</a:t>
-            </a:r>
             <a:endParaRPr lang="de-CH" sz="7200" b="1" dirty="0">
               <a:solidFill>
                 <a:schemeClr val="bg1"/>
@@ -4374,10 +4328,81 @@
           </a:p>
         </p:txBody>
       </p:sp>
+      <p:sp>
+        <p:nvSpPr>
+          <p:cNvPr id="7" name="Textfeld 6"/>
+          <p:cNvSpPr txBox="1"/>
+          <p:nvPr/>
+        </p:nvSpPr>
+        <p:spPr>
+          <a:xfrm>
+            <a:off x="471621" y="2032001"/>
+            <a:ext cx="237566" cy="369332"/>
+          </a:xfrm>
+          <a:prstGeom prst="rect">
+            <a:avLst/>
+          </a:prstGeom>
+          <a:noFill/>
+        </p:spPr>
+        <p:txBody>
+          <a:bodyPr wrap="none" rtlCol="0">
+            <a:spAutoFit/>
+          </a:bodyPr>
+          <a:lstStyle/>
+          <a:p>
+            <a:r>
+              <a:rPr lang="de-CH" dirty="0" smtClean="0"/>
+              <a:t> </a:t>
+            </a:r>
+            <a:endParaRPr lang="de-CH" dirty="0"/>
+          </a:p>
+        </p:txBody>
+      </p:sp>
+      <p:pic>
+        <p:nvPicPr>
+          <p:cNvPr id="1026" name="Picture 2" descr="C:\Users\James\workspaceLuna\PatientApp\doc\task09\soft-schema2.png"/>
+          <p:cNvPicPr>
+            <a:picLocks noChangeAspect="1" noChangeArrowheads="1"/>
+          </p:cNvPicPr>
+          <p:nvPr/>
+        </p:nvPicPr>
+        <p:blipFill>
+          <a:blip r:embed="rId2">
+            <a:extLst>
+              <a:ext uri="{28A0092B-C50C-407E-A947-70E740481C1C}">
+                <a14:useLocalDpi xmlns:a14="http://schemas.microsoft.com/office/drawing/2010/main" val="0"/>
+              </a:ext>
+            </a:extLst>
+          </a:blip>
+          <a:srcRect/>
+          <a:stretch>
+            <a:fillRect/>
+          </a:stretch>
+        </p:blipFill>
+        <p:spPr bwMode="auto">
+          <a:xfrm>
+            <a:off x="1381910" y="-43528"/>
+            <a:ext cx="9428180" cy="6977728"/>
+          </a:xfrm>
+          <a:prstGeom prst="rect">
+            <a:avLst/>
+          </a:prstGeom>
+          <a:noFill/>
+          <a:extLst>
+            <a:ext uri="{909E8E84-426E-40DD-AFC4-6F175D3DCCD1}">
+              <a14:hiddenFill xmlns:a14="http://schemas.microsoft.com/office/drawing/2010/main">
+                <a:solidFill>
+                  <a:srgbClr val="FFFFFF"/>
+                </a:solidFill>
+              </a14:hiddenFill>
+            </a:ext>
+          </a:extLst>
+        </p:spPr>
+      </p:pic>
     </p:spTree>
     <p:extLst>
       <p:ext uri="{BB962C8B-B14F-4D97-AF65-F5344CB8AC3E}">
-        <p14:creationId xmlns:p14="http://schemas.microsoft.com/office/powerpoint/2010/main" val="2092509293"/>
+        <p14:creationId xmlns:p14="http://schemas.microsoft.com/office/powerpoint/2010/main" val="3738221479"/>
       </p:ext>
     </p:extLst>
   </p:cSld>
@@ -4842,7 +4867,7 @@
   <a:extraClrSchemeLst/>
   <a:extLst>
     <a:ext uri="{05A4C25C-085E-4340-85A3-A5531E510DB2}">
-      <thm15:themeFamily xmlns:thm15="http://schemas.microsoft.com/office/thememl/2012/main" name="Office Theme" id="{62F939B6-93AF-4DB8-9C6B-D6C7DFDC589F}" vid="{4A3C46E8-61CC-4603-A589-7422A47A8E4A}"/>
+      <thm15:themeFamily xmlns:thm15="http://schemas.microsoft.com/office/thememl/2012/main" xmlns="" name="Office Theme" id="{62F939B6-93AF-4DB8-9C6B-D6C7DFDC589F}" vid="{4A3C46E8-61CC-4603-A589-7422A47A8E4A}"/>
     </a:ext>
   </a:extLst>
 </a:theme>

</xml_diff>